<commit_message>
🗃️ raw: Do some changes in main component
</commit_message>
<xml_diff>
--- a/apresentacao/Pokédex DSM.pptx
+++ b/apresentacao/Pokédex DSM.pptx
@@ -7,13 +7,15 @@
   <p:sldIdLst>
     <p:sldId id="256" r:id="rId2"/>
     <p:sldId id="257" r:id="rId3"/>
-    <p:sldId id="260" r:id="rId4"/>
+    <p:sldId id="266" r:id="rId4"/>
     <p:sldId id="261" r:id="rId5"/>
-    <p:sldId id="262" r:id="rId6"/>
-    <p:sldId id="263" r:id="rId7"/>
-    <p:sldId id="264" r:id="rId8"/>
-    <p:sldId id="265" r:id="rId9"/>
-    <p:sldId id="258" r:id="rId10"/>
+    <p:sldId id="260" r:id="rId6"/>
+    <p:sldId id="262" r:id="rId7"/>
+    <p:sldId id="263" r:id="rId8"/>
+    <p:sldId id="267" r:id="rId9"/>
+    <p:sldId id="264" r:id="rId10"/>
+    <p:sldId id="265" r:id="rId11"/>
+    <p:sldId id="258" r:id="rId12"/>
   </p:sldIdLst>
   <p:sldSz cx="12192000" cy="6858000"/>
   <p:notesSz cx="6858000" cy="9144000"/>
@@ -274,7 +276,7 @@
           <a:p>
             <a:fld id="{276D79ED-3FA7-4EF8-964B-EB8BCFAB02F8}" type="datetimeFigureOut">
               <a:rPr lang="en-US" smtClean="0"/>
-              <a:t>9/21/2025</a:t>
+              <a:t>9/22/2025</a:t>
             </a:fld>
             <a:endParaRPr lang="en-US"/>
           </a:p>
@@ -469,7 +471,7 @@
           <a:p>
             <a:fld id="{276D79ED-3FA7-4EF8-964B-EB8BCFAB02F8}" type="datetimeFigureOut">
               <a:rPr lang="en-US" smtClean="0"/>
-              <a:t>9/21/2025</a:t>
+              <a:t>9/22/2025</a:t>
             </a:fld>
             <a:endParaRPr lang="en-US"/>
           </a:p>
@@ -744,7 +746,7 @@
           <a:p>
             <a:fld id="{276D79ED-3FA7-4EF8-964B-EB8BCFAB02F8}" type="datetimeFigureOut">
               <a:rPr lang="en-US" smtClean="0"/>
-              <a:t>9/21/2025</a:t>
+              <a:t>9/22/2025</a:t>
             </a:fld>
             <a:endParaRPr lang="en-US"/>
           </a:p>
@@ -986,7 +988,7 @@
           <a:p>
             <a:fld id="{276D79ED-3FA7-4EF8-964B-EB8BCFAB02F8}" type="datetimeFigureOut">
               <a:rPr lang="en-US" smtClean="0"/>
-              <a:t>9/21/2025</a:t>
+              <a:t>9/22/2025</a:t>
             </a:fld>
             <a:endParaRPr lang="en-US"/>
           </a:p>
@@ -1353,7 +1355,7 @@
           <a:p>
             <a:fld id="{276D79ED-3FA7-4EF8-964B-EB8BCFAB02F8}" type="datetimeFigureOut">
               <a:rPr lang="en-US" smtClean="0"/>
-              <a:t>9/21/2025</a:t>
+              <a:t>9/22/2025</a:t>
             </a:fld>
             <a:endParaRPr lang="en-US"/>
           </a:p>
@@ -1471,7 +1473,7 @@
           <a:p>
             <a:fld id="{276D79ED-3FA7-4EF8-964B-EB8BCFAB02F8}" type="datetimeFigureOut">
               <a:rPr lang="en-US" smtClean="0"/>
-              <a:t>9/21/2025</a:t>
+              <a:t>9/22/2025</a:t>
             </a:fld>
             <a:endParaRPr lang="en-US"/>
           </a:p>
@@ -1566,7 +1568,7 @@
           <a:p>
             <a:fld id="{276D79ED-3FA7-4EF8-964B-EB8BCFAB02F8}" type="datetimeFigureOut">
               <a:rPr lang="en-US" smtClean="0"/>
-              <a:t>9/21/2025</a:t>
+              <a:t>9/22/2025</a:t>
             </a:fld>
             <a:endParaRPr lang="en-US"/>
           </a:p>
@@ -1843,7 +1845,7 @@
           <a:p>
             <a:fld id="{276D79ED-3FA7-4EF8-964B-EB8BCFAB02F8}" type="datetimeFigureOut">
               <a:rPr lang="en-US" smtClean="0"/>
-              <a:t>9/21/2025</a:t>
+              <a:t>9/22/2025</a:t>
             </a:fld>
             <a:endParaRPr lang="en-US"/>
           </a:p>
@@ -2100,7 +2102,7 @@
           <a:p>
             <a:fld id="{276D79ED-3FA7-4EF8-964B-EB8BCFAB02F8}" type="datetimeFigureOut">
               <a:rPr lang="en-US" smtClean="0"/>
-              <a:t>9/21/2025</a:t>
+              <a:t>9/22/2025</a:t>
             </a:fld>
             <a:endParaRPr lang="en-US"/>
           </a:p>
@@ -2326,7 +2328,7 @@
             <a:fld id="{276D79ED-3FA7-4EF8-964B-EB8BCFAB02F8}" type="datetimeFigureOut">
               <a:rPr lang="en-US" smtClean="0"/>
               <a:pPr/>
-              <a:t>9/21/2025</a:t>
+              <a:t>9/22/2025</a:t>
             </a:fld>
             <a:endParaRPr lang="en-US"/>
           </a:p>
@@ -2914,55 +2916,55 @@
         </p:nvSpPr>
         <p:spPr>
           <a:xfrm>
-            <a:off x="4822496" y="3924887"/>
-            <a:ext cx="5664761" cy="485594"/>
+            <a:off x="4692770" y="3562708"/>
+            <a:ext cx="5794487" cy="1192237"/>
           </a:xfrm>
         </p:spPr>
         <p:txBody>
           <a:bodyPr>
-            <a:normAutofit fontScale="55000" lnSpcReduction="20000"/>
+            <a:normAutofit/>
           </a:bodyPr>
           <a:lstStyle/>
           <a:p>
             <a:r>
-              <a:rPr lang="pt-BR" sz="2000" dirty="0"/>
+              <a:rPr lang="pt-BR" sz="1400" dirty="0"/>
               <a:t>Aplicativo mobile com Expo (</a:t>
             </a:r>
             <a:r>
-              <a:rPr lang="pt-BR" sz="2000" dirty="0" err="1"/>
+              <a:rPr lang="pt-BR" sz="1400" dirty="0" err="1"/>
               <a:t>React</a:t>
             </a:r>
             <a:r>
-              <a:rPr lang="pt-BR" sz="2000" dirty="0"/>
+              <a:rPr lang="pt-BR" sz="1400" dirty="0"/>
               <a:t> </a:t>
             </a:r>
             <a:r>
-              <a:rPr lang="pt-BR" sz="2000" dirty="0" err="1"/>
+              <a:rPr lang="pt-BR" sz="1400" dirty="0" err="1"/>
               <a:t>Native</a:t>
             </a:r>
             <a:r>
-              <a:rPr lang="pt-BR" sz="2000" dirty="0"/>
+              <a:rPr lang="pt-BR" sz="1400" dirty="0"/>
               <a:t> + </a:t>
             </a:r>
             <a:r>
-              <a:rPr lang="pt-BR" sz="2000" dirty="0" err="1"/>
+              <a:rPr lang="pt-BR" sz="1400" dirty="0" err="1"/>
               <a:t>TypeScript</a:t>
             </a:r>
             <a:r>
-              <a:rPr lang="pt-BR" sz="2000" dirty="0"/>
+              <a:rPr lang="pt-BR" sz="1400" dirty="0"/>
               <a:t>)</a:t>
             </a:r>
             <a:br>
-              <a:rPr lang="pt-BR" sz="2000" dirty="0"/>
+              <a:rPr lang="pt-BR" sz="1400" dirty="0"/>
             </a:br>
             <a:br>
-              <a:rPr lang="pt-BR" sz="2000" dirty="0"/>
+              <a:rPr lang="pt-BR" sz="1400" dirty="0"/>
             </a:br>
             <a:r>
-              <a:rPr lang="pt-BR" sz="2000" dirty="0"/>
+              <a:rPr lang="pt-BR" sz="1400" dirty="0"/>
               <a:t>Feito por: Gabriel Pessoni</a:t>
             </a:r>
-            <a:endParaRPr lang="en-US" sz="2000" b="1" dirty="0">
+            <a:endParaRPr lang="en-US" sz="1400" b="1" dirty="0">
               <a:solidFill>
                 <a:srgbClr val="E61B0A"/>
               </a:solidFill>
@@ -2974,6 +2976,201 @@
     <p:extLst>
       <p:ext uri="{BB962C8B-B14F-4D97-AF65-F5344CB8AC3E}">
         <p14:creationId xmlns:p14="http://schemas.microsoft.com/office/powerpoint/2010/main" val="720928810"/>
+      </p:ext>
+    </p:extLst>
+  </p:cSld>
+  <p:clrMapOvr>
+    <a:masterClrMapping/>
+  </p:clrMapOvr>
+</p:sld>
+</file>
+
+<file path=ppt/slides/slide10.xml><?xml version="1.0" encoding="utf-8"?>
+<p:sld xmlns:a="http://schemas.openxmlformats.org/drawingml/2006/main" xmlns:r="http://schemas.openxmlformats.org/officeDocument/2006/relationships" xmlns:p="http://schemas.openxmlformats.org/presentationml/2006/main">
+  <p:cSld>
+    <p:spTree>
+      <p:nvGrpSpPr>
+        <p:cNvPr id="1" name="">
+          <a:extLst>
+            <a:ext uri="{FF2B5EF4-FFF2-40B4-BE49-F238E27FC236}">
+              <a16:creationId xmlns:a16="http://schemas.microsoft.com/office/drawing/2014/main" id="{3ACD5F9C-E0A4-8F45-4E7B-59EBEBDD6728}"/>
+            </a:ext>
+          </a:extLst>
+        </p:cNvPr>
+        <p:cNvGrpSpPr/>
+        <p:nvPr/>
+      </p:nvGrpSpPr>
+      <p:grpSpPr>
+        <a:xfrm>
+          <a:off x="0" y="0"/>
+          <a:ext cx="0" cy="0"/>
+          <a:chOff x="0" y="0"/>
+          <a:chExt cx="0" cy="0"/>
+        </a:xfrm>
+      </p:grpSpPr>
+      <p:sp>
+        <p:nvSpPr>
+          <p:cNvPr id="2" name="Title 1">
+            <a:extLst>
+              <a:ext uri="{FF2B5EF4-FFF2-40B4-BE49-F238E27FC236}">
+                <a16:creationId xmlns:a16="http://schemas.microsoft.com/office/drawing/2014/main" id="{D4C5D38F-6CD2-564C-69EC-0A43EC1E8558}"/>
+              </a:ext>
+            </a:extLst>
+          </p:cNvPr>
+          <p:cNvSpPr>
+            <a:spLocks noGrp="1"/>
+          </p:cNvSpPr>
+          <p:nvPr>
+            <p:ph type="title"/>
+          </p:nvPr>
+        </p:nvSpPr>
+        <p:spPr/>
+        <p:txBody>
+          <a:bodyPr/>
+          <a:lstStyle/>
+          <a:p>
+            <a:r>
+              <a:rPr lang="pt-BR" dirty="0"/>
+              <a:t>Persistência de Dados</a:t>
+            </a:r>
+            <a:endParaRPr lang="en-US" dirty="0"/>
+          </a:p>
+        </p:txBody>
+      </p:sp>
+      <p:pic>
+        <p:nvPicPr>
+          <p:cNvPr id="7" name="Imagem 6">
+            <a:extLst>
+              <a:ext uri="{FF2B5EF4-FFF2-40B4-BE49-F238E27FC236}">
+                <a16:creationId xmlns:a16="http://schemas.microsoft.com/office/drawing/2014/main" id="{8D658623-4270-BFEB-FD8F-32FA5D1C5413}"/>
+              </a:ext>
+            </a:extLst>
+          </p:cNvPr>
+          <p:cNvPicPr>
+            <a:picLocks noChangeAspect="1"/>
+          </p:cNvPicPr>
+          <p:nvPr/>
+        </p:nvPicPr>
+        <p:blipFill>
+          <a:blip r:embed="rId2"/>
+          <a:stretch>
+            <a:fillRect/>
+          </a:stretch>
+        </p:blipFill>
+        <p:spPr>
+          <a:xfrm>
+            <a:off x="882595" y="1909917"/>
+            <a:ext cx="7169504" cy="3864083"/>
+          </a:xfrm>
+          <a:prstGeom prst="rect">
+            <a:avLst/>
+          </a:prstGeom>
+        </p:spPr>
+      </p:pic>
+    </p:spTree>
+    <p:extLst>
+      <p:ext uri="{BB962C8B-B14F-4D97-AF65-F5344CB8AC3E}">
+        <p14:creationId xmlns:p14="http://schemas.microsoft.com/office/powerpoint/2010/main" val="3659142428"/>
+      </p:ext>
+    </p:extLst>
+  </p:cSld>
+  <p:clrMapOvr>
+    <a:masterClrMapping/>
+  </p:clrMapOvr>
+</p:sld>
+</file>
+
+<file path=ppt/slides/slide11.xml><?xml version="1.0" encoding="utf-8"?>
+<p:sld xmlns:a="http://schemas.openxmlformats.org/drawingml/2006/main" xmlns:r="http://schemas.openxmlformats.org/officeDocument/2006/relationships" xmlns:p="http://schemas.openxmlformats.org/presentationml/2006/main">
+  <p:cSld>
+    <p:spTree>
+      <p:nvGrpSpPr>
+        <p:cNvPr id="1" name=""/>
+        <p:cNvGrpSpPr/>
+        <p:nvPr/>
+      </p:nvGrpSpPr>
+      <p:grpSpPr>
+        <a:xfrm>
+          <a:off x="0" y="0"/>
+          <a:ext cx="0" cy="0"/>
+          <a:chOff x="0" y="0"/>
+          <a:chExt cx="0" cy="0"/>
+        </a:xfrm>
+      </p:grpSpPr>
+      <p:sp>
+        <p:nvSpPr>
+          <p:cNvPr id="2" name="Title 1">
+            <a:extLst>
+              <a:ext uri="{FF2B5EF4-FFF2-40B4-BE49-F238E27FC236}">
+                <a16:creationId xmlns:a16="http://schemas.microsoft.com/office/drawing/2014/main" id="{D9B1F0FB-5829-4949-9E35-841A9DF31F2D}"/>
+              </a:ext>
+            </a:extLst>
+          </p:cNvPr>
+          <p:cNvSpPr>
+            <a:spLocks noGrp="1"/>
+          </p:cNvSpPr>
+          <p:nvPr>
+            <p:ph type="title"/>
+          </p:nvPr>
+        </p:nvSpPr>
+        <p:spPr/>
+        <p:txBody>
+          <a:bodyPr/>
+          <a:lstStyle/>
+          <a:p>
+            <a:r>
+              <a:rPr lang="pt-BR" dirty="0"/>
+              <a:t>Demonstração </a:t>
+            </a:r>
+            <a:endParaRPr lang="en-GB" dirty="0"/>
+          </a:p>
+        </p:txBody>
+      </p:sp>
+      <p:sp>
+        <p:nvSpPr>
+          <p:cNvPr id="3" name="Text Placeholder 2">
+            <a:extLst>
+              <a:ext uri="{FF2B5EF4-FFF2-40B4-BE49-F238E27FC236}">
+                <a16:creationId xmlns:a16="http://schemas.microsoft.com/office/drawing/2014/main" id="{5ACFCE3B-D4B3-6743-AC05-A671F006A87F}"/>
+              </a:ext>
+            </a:extLst>
+          </p:cNvPr>
+          <p:cNvSpPr>
+            <a:spLocks noGrp="1"/>
+          </p:cNvSpPr>
+          <p:nvPr>
+            <p:ph type="body" idx="1"/>
+          </p:nvPr>
+        </p:nvSpPr>
+        <p:spPr/>
+        <p:txBody>
+          <a:bodyPr/>
+          <a:lstStyle/>
+          <a:p>
+            <a:r>
+              <a:rPr lang="en-GB" dirty="0"/>
+              <a:t>Da </a:t>
+            </a:r>
+            <a:r>
+              <a:rPr lang="en-GB" dirty="0" err="1"/>
+              <a:t>nossa</a:t>
+            </a:r>
+            <a:r>
+              <a:rPr lang="en-GB" dirty="0"/>
+              <a:t> </a:t>
+            </a:r>
+            <a:r>
+              <a:rPr lang="en-GB" dirty="0" err="1"/>
+              <a:t>pokédex</a:t>
+            </a:r>
+            <a:endParaRPr lang="en-GB" dirty="0"/>
+          </a:p>
+        </p:txBody>
+      </p:sp>
+    </p:spTree>
+    <p:extLst>
+      <p:ext uri="{BB962C8B-B14F-4D97-AF65-F5344CB8AC3E}">
+        <p14:creationId xmlns:p14="http://schemas.microsoft.com/office/powerpoint/2010/main" val="3026865914"/>
       </p:ext>
     </p:extLst>
   </p:cSld>
@@ -3147,6 +3344,359 @@
 </file>
 
 <file path=ppt/slides/slide3.xml><?xml version="1.0" encoding="utf-8"?>
+<p:sld xmlns:a="http://schemas.openxmlformats.org/drawingml/2006/main" xmlns:r="http://schemas.openxmlformats.org/officeDocument/2006/relationships" xmlns:p="http://schemas.openxmlformats.org/presentationml/2006/main">
+  <p:cSld>
+    <p:spTree>
+      <p:nvGrpSpPr>
+        <p:cNvPr id="1" name="">
+          <a:extLst>
+            <a:ext uri="{FF2B5EF4-FFF2-40B4-BE49-F238E27FC236}">
+              <a16:creationId xmlns:a16="http://schemas.microsoft.com/office/drawing/2014/main" id="{1D144F2A-2ACA-AADC-C797-E6D340431AE7}"/>
+            </a:ext>
+          </a:extLst>
+        </p:cNvPr>
+        <p:cNvGrpSpPr/>
+        <p:nvPr/>
+      </p:nvGrpSpPr>
+      <p:grpSpPr>
+        <a:xfrm>
+          <a:off x="0" y="0"/>
+          <a:ext cx="0" cy="0"/>
+          <a:chOff x="0" y="0"/>
+          <a:chExt cx="0" cy="0"/>
+        </a:xfrm>
+      </p:grpSpPr>
+      <p:sp>
+        <p:nvSpPr>
+          <p:cNvPr id="2" name="Title 1">
+            <a:extLst>
+              <a:ext uri="{FF2B5EF4-FFF2-40B4-BE49-F238E27FC236}">
+                <a16:creationId xmlns:a16="http://schemas.microsoft.com/office/drawing/2014/main" id="{D887BC92-A37E-DBB8-93B8-B3F719257230}"/>
+              </a:ext>
+            </a:extLst>
+          </p:cNvPr>
+          <p:cNvSpPr>
+            <a:spLocks noGrp="1"/>
+          </p:cNvSpPr>
+          <p:nvPr>
+            <p:ph type="title"/>
+          </p:nvPr>
+        </p:nvSpPr>
+        <p:spPr/>
+        <p:txBody>
+          <a:bodyPr/>
+          <a:lstStyle/>
+          <a:p>
+            <a:r>
+              <a:rPr lang="pt-BR" dirty="0"/>
+              <a:t>Tecnologias Utilizadas</a:t>
+            </a:r>
+            <a:endParaRPr lang="en-US" dirty="0"/>
+          </a:p>
+        </p:txBody>
+      </p:sp>
+      <p:sp>
+        <p:nvSpPr>
+          <p:cNvPr id="3" name="Content Placeholder 2">
+            <a:extLst>
+              <a:ext uri="{FF2B5EF4-FFF2-40B4-BE49-F238E27FC236}">
+                <a16:creationId xmlns:a16="http://schemas.microsoft.com/office/drawing/2014/main" id="{BBF86B4F-7014-50F3-6327-5953E3FE34DA}"/>
+              </a:ext>
+            </a:extLst>
+          </p:cNvPr>
+          <p:cNvSpPr>
+            <a:spLocks noGrp="1"/>
+          </p:cNvSpPr>
+          <p:nvPr>
+            <p:ph idx="1"/>
+          </p:nvPr>
+        </p:nvSpPr>
+        <p:spPr>
+          <a:xfrm>
+            <a:off x="530673" y="1841862"/>
+            <a:ext cx="8623663" cy="4387352"/>
+          </a:xfrm>
+        </p:spPr>
+        <p:txBody>
+          <a:bodyPr>
+            <a:normAutofit lnSpcReduction="10000"/>
+          </a:bodyPr>
+          <a:lstStyle/>
+          <a:p>
+            <a:r>
+              <a:rPr lang="pt-BR" dirty="0" err="1"/>
+              <a:t>TypeScript</a:t>
+            </a:r>
+            <a:r>
+              <a:rPr lang="pt-BR" dirty="0"/>
+              <a:t> – Fornece tipagem estática, aumentando a confiabilidade do código e reduzindo erros em tempo de execução.</a:t>
+            </a:r>
+          </a:p>
+          <a:p>
+            <a:endParaRPr lang="pt-BR" dirty="0"/>
+          </a:p>
+          <a:p>
+            <a:r>
+              <a:rPr lang="pt-BR" dirty="0" err="1"/>
+              <a:t>React</a:t>
+            </a:r>
+            <a:r>
+              <a:rPr lang="pt-BR" dirty="0"/>
+              <a:t> </a:t>
+            </a:r>
+            <a:r>
+              <a:rPr lang="pt-BR" dirty="0" err="1"/>
+              <a:t>Native</a:t>
+            </a:r>
+            <a:r>
+              <a:rPr lang="pt-BR" dirty="0"/>
+              <a:t> – Permite desenvolvimento multiplataforma (iOS e Android) com uma única base de código.</a:t>
+            </a:r>
+          </a:p>
+          <a:p>
+            <a:endParaRPr lang="pt-BR" dirty="0"/>
+          </a:p>
+          <a:p>
+            <a:r>
+              <a:rPr lang="pt-BR" dirty="0"/>
+              <a:t>Expo – Simplifica o desenvolvimento com ferramentas integradas, build rápida e fácil integração de bibliotecas nativas.</a:t>
+            </a:r>
+            <a:endParaRPr lang="en-US" sz="2400" dirty="0">
+              <a:solidFill>
+                <a:srgbClr val="E02CB1"/>
+              </a:solidFill>
+            </a:endParaRPr>
+          </a:p>
+        </p:txBody>
+      </p:sp>
+    </p:spTree>
+    <p:extLst>
+      <p:ext uri="{BB962C8B-B14F-4D97-AF65-F5344CB8AC3E}">
+        <p14:creationId xmlns:p14="http://schemas.microsoft.com/office/powerpoint/2010/main" val="2667800918"/>
+      </p:ext>
+    </p:extLst>
+  </p:cSld>
+  <p:clrMapOvr>
+    <a:masterClrMapping/>
+  </p:clrMapOvr>
+</p:sld>
+</file>
+
+<file path=ppt/slides/slide4.xml><?xml version="1.0" encoding="utf-8"?>
+<p:sld xmlns:a="http://schemas.openxmlformats.org/drawingml/2006/main" xmlns:r="http://schemas.openxmlformats.org/officeDocument/2006/relationships" xmlns:p="http://schemas.openxmlformats.org/presentationml/2006/main">
+  <p:cSld>
+    <p:spTree>
+      <p:nvGrpSpPr>
+        <p:cNvPr id="1" name="">
+          <a:extLst>
+            <a:ext uri="{FF2B5EF4-FFF2-40B4-BE49-F238E27FC236}">
+              <a16:creationId xmlns:a16="http://schemas.microsoft.com/office/drawing/2014/main" id="{F1B115C2-BC84-BFF3-F31D-6B92D55CD8E3}"/>
+            </a:ext>
+          </a:extLst>
+        </p:cNvPr>
+        <p:cNvGrpSpPr/>
+        <p:nvPr/>
+      </p:nvGrpSpPr>
+      <p:grpSpPr>
+        <a:xfrm>
+          <a:off x="0" y="0"/>
+          <a:ext cx="0" cy="0"/>
+          <a:chOff x="0" y="0"/>
+          <a:chExt cx="0" cy="0"/>
+        </a:xfrm>
+      </p:grpSpPr>
+      <p:sp>
+        <p:nvSpPr>
+          <p:cNvPr id="2" name="Title 1">
+            <a:extLst>
+              <a:ext uri="{FF2B5EF4-FFF2-40B4-BE49-F238E27FC236}">
+                <a16:creationId xmlns:a16="http://schemas.microsoft.com/office/drawing/2014/main" id="{A9C5F6F4-CFB9-9BCC-2F06-114A2A6A246D}"/>
+              </a:ext>
+            </a:extLst>
+          </p:cNvPr>
+          <p:cNvSpPr>
+            <a:spLocks noGrp="1"/>
+          </p:cNvSpPr>
+          <p:nvPr>
+            <p:ph type="title"/>
+          </p:nvPr>
+        </p:nvSpPr>
+        <p:spPr/>
+        <p:txBody>
+          <a:bodyPr/>
+          <a:lstStyle/>
+          <a:p>
+            <a:r>
+              <a:rPr lang="pt-BR" dirty="0"/>
+              <a:t>Bibliotecas Utilizadas</a:t>
+            </a:r>
+            <a:endParaRPr lang="en-US" dirty="0"/>
+          </a:p>
+        </p:txBody>
+      </p:sp>
+      <p:sp>
+        <p:nvSpPr>
+          <p:cNvPr id="3" name="Content Placeholder 2">
+            <a:extLst>
+              <a:ext uri="{FF2B5EF4-FFF2-40B4-BE49-F238E27FC236}">
+                <a16:creationId xmlns:a16="http://schemas.microsoft.com/office/drawing/2014/main" id="{F1F0557B-D1C6-5B70-5277-0E64E925C617}"/>
+              </a:ext>
+            </a:extLst>
+          </p:cNvPr>
+          <p:cNvSpPr>
+            <a:spLocks noGrp="1"/>
+          </p:cNvSpPr>
+          <p:nvPr>
+            <p:ph idx="1"/>
+          </p:nvPr>
+        </p:nvSpPr>
+        <p:spPr/>
+        <p:txBody>
+          <a:bodyPr>
+            <a:normAutofit/>
+          </a:bodyPr>
+          <a:lstStyle/>
+          <a:p>
+            <a:r>
+              <a:rPr lang="pt-BR" dirty="0"/>
+              <a:t>Core: </a:t>
+            </a:r>
+            <a:r>
+              <a:rPr lang="pt-BR" dirty="0" err="1"/>
+              <a:t>React</a:t>
+            </a:r>
+            <a:r>
+              <a:rPr lang="pt-BR" dirty="0"/>
+              <a:t> </a:t>
+            </a:r>
+            <a:r>
+              <a:rPr lang="pt-BR" dirty="0" err="1"/>
+              <a:t>Native</a:t>
+            </a:r>
+            <a:r>
+              <a:rPr lang="pt-BR" dirty="0"/>
+              <a:t> + Expo</a:t>
+            </a:r>
+          </a:p>
+          <a:p>
+            <a:r>
+              <a:rPr lang="pt-BR" dirty="0"/>
+              <a:t>Navegação: </a:t>
+            </a:r>
+            <a:r>
+              <a:rPr lang="pt-BR" dirty="0" err="1"/>
+              <a:t>React</a:t>
+            </a:r>
+            <a:r>
+              <a:rPr lang="pt-BR" dirty="0"/>
+              <a:t> </a:t>
+            </a:r>
+            <a:r>
+              <a:rPr lang="pt-BR" dirty="0" err="1"/>
+              <a:t>Navigation</a:t>
+            </a:r>
+            <a:r>
+              <a:rPr lang="pt-BR" dirty="0"/>
+              <a:t> Stack</a:t>
+            </a:r>
+          </a:p>
+          <a:p>
+            <a:r>
+              <a:rPr lang="pt-BR" dirty="0"/>
+              <a:t>UI: </a:t>
+            </a:r>
+            <a:r>
+              <a:rPr lang="pt-BR" dirty="0" err="1"/>
+              <a:t>styled-components</a:t>
+            </a:r>
+            <a:r>
+              <a:rPr lang="pt-BR" dirty="0"/>
+              <a:t>, @expo/vector-icons</a:t>
+            </a:r>
+          </a:p>
+          <a:p>
+            <a:r>
+              <a:rPr lang="pt-BR" dirty="0" err="1"/>
+              <a:t>Forms</a:t>
+            </a:r>
+            <a:r>
+              <a:rPr lang="pt-BR" dirty="0"/>
+              <a:t>: </a:t>
+            </a:r>
+            <a:r>
+              <a:rPr lang="pt-BR" dirty="0" err="1"/>
+              <a:t>react-native-mask-text</a:t>
+            </a:r>
+            <a:r>
+              <a:rPr lang="pt-BR" dirty="0"/>
+              <a:t>, </a:t>
+            </a:r>
+            <a:r>
+              <a:rPr lang="pt-BR" dirty="0" err="1"/>
+              <a:t>picker</a:t>
+            </a:r>
+            <a:endParaRPr lang="pt-BR" dirty="0"/>
+          </a:p>
+          <a:p>
+            <a:r>
+              <a:rPr lang="pt-BR" dirty="0" err="1"/>
+              <a:t>Storage</a:t>
+            </a:r>
+            <a:r>
+              <a:rPr lang="pt-BR" dirty="0"/>
+              <a:t>: </a:t>
+            </a:r>
+            <a:r>
+              <a:rPr lang="pt-BR" dirty="0" err="1"/>
+              <a:t>AsyncStorage</a:t>
+            </a:r>
+            <a:endParaRPr lang="pt-BR" dirty="0"/>
+          </a:p>
+          <a:p>
+            <a:r>
+              <a:rPr lang="pt-BR" dirty="0"/>
+              <a:t>HTTP: </a:t>
+            </a:r>
+            <a:r>
+              <a:rPr lang="pt-BR" dirty="0" err="1"/>
+              <a:t>Axios</a:t>
+            </a:r>
+            <a:endParaRPr lang="pt-BR" dirty="0"/>
+          </a:p>
+          <a:p>
+            <a:r>
+              <a:rPr lang="pt-BR" dirty="0"/>
+              <a:t>Feedback: </a:t>
+            </a:r>
+            <a:r>
+              <a:rPr lang="pt-BR" dirty="0" err="1"/>
+              <a:t>react-native-toast-message</a:t>
+            </a:r>
+            <a:endParaRPr lang="pt-BR" dirty="0"/>
+          </a:p>
+          <a:p>
+            <a:endParaRPr lang="en-US" dirty="0">
+              <a:solidFill>
+                <a:srgbClr val="E02CB1"/>
+              </a:solidFill>
+            </a:endParaRPr>
+          </a:p>
+        </p:txBody>
+      </p:sp>
+    </p:spTree>
+    <p:extLst>
+      <p:ext uri="{BB962C8B-B14F-4D97-AF65-F5344CB8AC3E}">
+        <p14:creationId xmlns:p14="http://schemas.microsoft.com/office/powerpoint/2010/main" val="629067560"/>
+      </p:ext>
+    </p:extLst>
+  </p:cSld>
+  <p:clrMapOvr>
+    <a:masterClrMapping/>
+  </p:clrMapOvr>
+</p:sld>
+</file>
+
+<file path=ppt/slides/slide5.xml><?xml version="1.0" encoding="utf-8"?>
 <p:sld xmlns:a="http://schemas.openxmlformats.org/drawingml/2006/main" xmlns:r="http://schemas.openxmlformats.org/officeDocument/2006/relationships" xmlns:p="http://schemas.openxmlformats.org/presentationml/2006/main">
   <p:cSld>
     <p:spTree>
@@ -3278,221 +3828,7 @@
 </p:sld>
 </file>
 
-<file path=ppt/slides/slide4.xml><?xml version="1.0" encoding="utf-8"?>
-<p:sld xmlns:a="http://schemas.openxmlformats.org/drawingml/2006/main" xmlns:r="http://schemas.openxmlformats.org/officeDocument/2006/relationships" xmlns:p="http://schemas.openxmlformats.org/presentationml/2006/main">
-  <p:cSld>
-    <p:spTree>
-      <p:nvGrpSpPr>
-        <p:cNvPr id="1" name="">
-          <a:extLst>
-            <a:ext uri="{FF2B5EF4-FFF2-40B4-BE49-F238E27FC236}">
-              <a16:creationId xmlns:a16="http://schemas.microsoft.com/office/drawing/2014/main" id="{F1B115C2-BC84-BFF3-F31D-6B92D55CD8E3}"/>
-            </a:ext>
-          </a:extLst>
-        </p:cNvPr>
-        <p:cNvGrpSpPr/>
-        <p:nvPr/>
-      </p:nvGrpSpPr>
-      <p:grpSpPr>
-        <a:xfrm>
-          <a:off x="0" y="0"/>
-          <a:ext cx="0" cy="0"/>
-          <a:chOff x="0" y="0"/>
-          <a:chExt cx="0" cy="0"/>
-        </a:xfrm>
-      </p:grpSpPr>
-      <p:sp>
-        <p:nvSpPr>
-          <p:cNvPr id="2" name="Title 1">
-            <a:extLst>
-              <a:ext uri="{FF2B5EF4-FFF2-40B4-BE49-F238E27FC236}">
-                <a16:creationId xmlns:a16="http://schemas.microsoft.com/office/drawing/2014/main" id="{A9C5F6F4-CFB9-9BCC-2F06-114A2A6A246D}"/>
-              </a:ext>
-            </a:extLst>
-          </p:cNvPr>
-          <p:cNvSpPr>
-            <a:spLocks noGrp="1"/>
-          </p:cNvSpPr>
-          <p:nvPr>
-            <p:ph type="title"/>
-          </p:nvPr>
-        </p:nvSpPr>
-        <p:spPr/>
-        <p:txBody>
-          <a:bodyPr/>
-          <a:lstStyle/>
-          <a:p>
-            <a:r>
-              <a:rPr lang="pt-BR" dirty="0"/>
-              <a:t>Bibliotecas Utilizadas</a:t>
-            </a:r>
-            <a:endParaRPr lang="en-US" dirty="0"/>
-          </a:p>
-        </p:txBody>
-      </p:sp>
-      <p:sp>
-        <p:nvSpPr>
-          <p:cNvPr id="3" name="Content Placeholder 2">
-            <a:extLst>
-              <a:ext uri="{FF2B5EF4-FFF2-40B4-BE49-F238E27FC236}">
-                <a16:creationId xmlns:a16="http://schemas.microsoft.com/office/drawing/2014/main" id="{F1F0557B-D1C6-5B70-5277-0E64E925C617}"/>
-              </a:ext>
-            </a:extLst>
-          </p:cNvPr>
-          <p:cNvSpPr>
-            <a:spLocks noGrp="1"/>
-          </p:cNvSpPr>
-          <p:nvPr>
-            <p:ph idx="1"/>
-          </p:nvPr>
-        </p:nvSpPr>
-        <p:spPr/>
-        <p:txBody>
-          <a:bodyPr>
-            <a:normAutofit/>
-          </a:bodyPr>
-          <a:lstStyle/>
-          <a:p>
-            <a:r>
-              <a:rPr lang="pt-BR" dirty="0"/>
-              <a:t>Core: </a:t>
-            </a:r>
-            <a:r>
-              <a:rPr lang="pt-BR" dirty="0" err="1"/>
-              <a:t>React</a:t>
-            </a:r>
-            <a:r>
-              <a:rPr lang="pt-BR" dirty="0"/>
-              <a:t> </a:t>
-            </a:r>
-            <a:r>
-              <a:rPr lang="pt-BR" dirty="0" err="1"/>
-              <a:t>Native</a:t>
-            </a:r>
-            <a:r>
-              <a:rPr lang="pt-BR" dirty="0"/>
-              <a:t> + Expo</a:t>
-            </a:r>
-          </a:p>
-          <a:p>
-            <a:r>
-              <a:rPr lang="pt-BR" dirty="0"/>
-              <a:t>Navegação: </a:t>
-            </a:r>
-            <a:r>
-              <a:rPr lang="pt-BR" dirty="0" err="1"/>
-              <a:t>React</a:t>
-            </a:r>
-            <a:r>
-              <a:rPr lang="pt-BR" dirty="0"/>
-              <a:t> </a:t>
-            </a:r>
-            <a:r>
-              <a:rPr lang="pt-BR" dirty="0" err="1"/>
-              <a:t>Navigation</a:t>
-            </a:r>
-            <a:r>
-              <a:rPr lang="pt-BR" dirty="0"/>
-              <a:t> Stack</a:t>
-            </a:r>
-          </a:p>
-          <a:p>
-            <a:r>
-              <a:rPr lang="pt-BR" dirty="0"/>
-              <a:t>UI: </a:t>
-            </a:r>
-            <a:r>
-              <a:rPr lang="pt-BR" dirty="0" err="1"/>
-              <a:t>styled-components</a:t>
-            </a:r>
-            <a:r>
-              <a:rPr lang="pt-BR" dirty="0"/>
-              <a:t>, @expo/vector-icons</a:t>
-            </a:r>
-          </a:p>
-          <a:p>
-            <a:r>
-              <a:rPr lang="pt-BR" dirty="0" err="1"/>
-              <a:t>Forms</a:t>
-            </a:r>
-            <a:r>
-              <a:rPr lang="pt-BR" dirty="0"/>
-              <a:t>: </a:t>
-            </a:r>
-            <a:r>
-              <a:rPr lang="pt-BR" dirty="0" err="1"/>
-              <a:t>react-native-mask-text</a:t>
-            </a:r>
-            <a:r>
-              <a:rPr lang="pt-BR" dirty="0"/>
-              <a:t>, </a:t>
-            </a:r>
-            <a:r>
-              <a:rPr lang="pt-BR" dirty="0" err="1"/>
-              <a:t>picker</a:t>
-            </a:r>
-            <a:endParaRPr lang="pt-BR" dirty="0"/>
-          </a:p>
-          <a:p>
-            <a:r>
-              <a:rPr lang="pt-BR" dirty="0" err="1"/>
-              <a:t>Storage</a:t>
-            </a:r>
-            <a:r>
-              <a:rPr lang="pt-BR" dirty="0"/>
-              <a:t>: </a:t>
-            </a:r>
-            <a:r>
-              <a:rPr lang="pt-BR" dirty="0" err="1"/>
-              <a:t>AsyncStorage</a:t>
-            </a:r>
-            <a:endParaRPr lang="pt-BR" dirty="0"/>
-          </a:p>
-          <a:p>
-            <a:r>
-              <a:rPr lang="pt-BR" dirty="0"/>
-              <a:t>HTTP: </a:t>
-            </a:r>
-            <a:r>
-              <a:rPr lang="pt-BR" dirty="0" err="1"/>
-              <a:t>Axios</a:t>
-            </a:r>
-            <a:endParaRPr lang="pt-BR" dirty="0"/>
-          </a:p>
-          <a:p>
-            <a:r>
-              <a:rPr lang="pt-BR" dirty="0"/>
-              <a:t>Feedback: </a:t>
-            </a:r>
-            <a:r>
-              <a:rPr lang="pt-BR" dirty="0" err="1"/>
-              <a:t>react-native-toast-message</a:t>
-            </a:r>
-            <a:endParaRPr lang="pt-BR" dirty="0"/>
-          </a:p>
-          <a:p>
-            <a:endParaRPr lang="en-US" dirty="0">
-              <a:solidFill>
-                <a:srgbClr val="E02CB1"/>
-              </a:solidFill>
-            </a:endParaRPr>
-          </a:p>
-        </p:txBody>
-      </p:sp>
-    </p:spTree>
-    <p:extLst>
-      <p:ext uri="{BB962C8B-B14F-4D97-AF65-F5344CB8AC3E}">
-        <p14:creationId xmlns:p14="http://schemas.microsoft.com/office/powerpoint/2010/main" val="629067560"/>
-      </p:ext>
-    </p:extLst>
-  </p:cSld>
-  <p:clrMapOvr>
-    <a:masterClrMapping/>
-  </p:clrMapOvr>
-</p:sld>
-</file>
-
-<file path=ppt/slides/slide5.xml><?xml version="1.0" encoding="utf-8"?>
+<file path=ppt/slides/slide6.xml><?xml version="1.0" encoding="utf-8"?>
 <p:sld xmlns:a="http://schemas.openxmlformats.org/drawingml/2006/main" xmlns:r="http://schemas.openxmlformats.org/officeDocument/2006/relationships" xmlns:p="http://schemas.openxmlformats.org/presentationml/2006/main">
   <p:cSld>
     <p:spTree>
@@ -3661,7 +3997,7 @@
 </p:sld>
 </file>
 
-<file path=ppt/slides/slide6.xml><?xml version="1.0" encoding="utf-8"?>
+<file path=ppt/slides/slide7.xml><?xml version="1.0" encoding="utf-8"?>
 <p:sld xmlns:a="http://schemas.openxmlformats.org/drawingml/2006/main" xmlns:r="http://schemas.openxmlformats.org/officeDocument/2006/relationships" xmlns:p="http://schemas.openxmlformats.org/presentationml/2006/main">
   <p:cSld>
     <p:spTree>
@@ -3948,7 +4284,102 @@
 </p:sld>
 </file>
 
-<file path=ppt/slides/slide7.xml><?xml version="1.0" encoding="utf-8"?>
+<file path=ppt/slides/slide8.xml><?xml version="1.0" encoding="utf-8"?>
+<p:sld xmlns:a="http://schemas.openxmlformats.org/drawingml/2006/main" xmlns:r="http://schemas.openxmlformats.org/officeDocument/2006/relationships" xmlns:p="http://schemas.openxmlformats.org/presentationml/2006/main">
+  <p:cSld>
+    <p:spTree>
+      <p:nvGrpSpPr>
+        <p:cNvPr id="1" name="">
+          <a:extLst>
+            <a:ext uri="{FF2B5EF4-FFF2-40B4-BE49-F238E27FC236}">
+              <a16:creationId xmlns:a16="http://schemas.microsoft.com/office/drawing/2014/main" id="{70A8D747-D182-30DA-27B8-20239D1A8C09}"/>
+            </a:ext>
+          </a:extLst>
+        </p:cNvPr>
+        <p:cNvGrpSpPr/>
+        <p:nvPr/>
+      </p:nvGrpSpPr>
+      <p:grpSpPr>
+        <a:xfrm>
+          <a:off x="0" y="0"/>
+          <a:ext cx="0" cy="0"/>
+          <a:chOff x="0" y="0"/>
+          <a:chExt cx="0" cy="0"/>
+        </a:xfrm>
+      </p:grpSpPr>
+      <p:sp>
+        <p:nvSpPr>
+          <p:cNvPr id="2" name="Title 1">
+            <a:extLst>
+              <a:ext uri="{FF2B5EF4-FFF2-40B4-BE49-F238E27FC236}">
+                <a16:creationId xmlns:a16="http://schemas.microsoft.com/office/drawing/2014/main" id="{965D30E9-13C5-B6B9-0A30-01A8F2416BC4}"/>
+              </a:ext>
+            </a:extLst>
+          </p:cNvPr>
+          <p:cNvSpPr>
+            <a:spLocks noGrp="1"/>
+          </p:cNvSpPr>
+          <p:nvPr>
+            <p:ph type="title"/>
+          </p:nvPr>
+        </p:nvSpPr>
+        <p:spPr/>
+        <p:txBody>
+          <a:bodyPr/>
+          <a:lstStyle/>
+          <a:p>
+            <a:r>
+              <a:rPr lang="pt-BR" dirty="0"/>
+              <a:t>Cadastro de Usuários</a:t>
+            </a:r>
+            <a:endParaRPr lang="en-US" dirty="0"/>
+          </a:p>
+        </p:txBody>
+      </p:sp>
+      <p:pic>
+        <p:nvPicPr>
+          <p:cNvPr id="4" name="Imagem 3">
+            <a:extLst>
+              <a:ext uri="{FF2B5EF4-FFF2-40B4-BE49-F238E27FC236}">
+                <a16:creationId xmlns:a16="http://schemas.microsoft.com/office/drawing/2014/main" id="{E7C5379A-C0A7-F18A-B3D6-DFE7659BB9C3}"/>
+              </a:ext>
+            </a:extLst>
+          </p:cNvPr>
+          <p:cNvPicPr>
+            <a:picLocks noChangeAspect="1"/>
+          </p:cNvPicPr>
+          <p:nvPr/>
+        </p:nvPicPr>
+        <p:blipFill>
+          <a:blip r:embed="rId2"/>
+          <a:stretch>
+            <a:fillRect/>
+          </a:stretch>
+        </p:blipFill>
+        <p:spPr>
+          <a:xfrm>
+            <a:off x="1071888" y="1819777"/>
+            <a:ext cx="7524752" cy="4028932"/>
+          </a:xfrm>
+          <a:prstGeom prst="rect">
+            <a:avLst/>
+          </a:prstGeom>
+        </p:spPr>
+      </p:pic>
+    </p:spTree>
+    <p:extLst>
+      <p:ext uri="{BB962C8B-B14F-4D97-AF65-F5344CB8AC3E}">
+        <p14:creationId xmlns:p14="http://schemas.microsoft.com/office/powerpoint/2010/main" val="2234447379"/>
+      </p:ext>
+    </p:extLst>
+  </p:cSld>
+  <p:clrMapOvr>
+    <a:masterClrMapping/>
+  </p:clrMapOvr>
+</p:sld>
+</file>
+
+<file path=ppt/slides/slide9.xml><?xml version="1.0" encoding="utf-8"?>
 <p:sld xmlns:a="http://schemas.openxmlformats.org/drawingml/2006/main" xmlns:r="http://schemas.openxmlformats.org/officeDocument/2006/relationships" xmlns:p="http://schemas.openxmlformats.org/presentationml/2006/main">
   <p:cSld>
     <p:spTree>
@@ -4203,201 +4634,6 @@
     <p:extLst>
       <p:ext uri="{BB962C8B-B14F-4D97-AF65-F5344CB8AC3E}">
         <p14:creationId xmlns:p14="http://schemas.microsoft.com/office/powerpoint/2010/main" val="3313418047"/>
-      </p:ext>
-    </p:extLst>
-  </p:cSld>
-  <p:clrMapOvr>
-    <a:masterClrMapping/>
-  </p:clrMapOvr>
-</p:sld>
-</file>
-
-<file path=ppt/slides/slide8.xml><?xml version="1.0" encoding="utf-8"?>
-<p:sld xmlns:a="http://schemas.openxmlformats.org/drawingml/2006/main" xmlns:r="http://schemas.openxmlformats.org/officeDocument/2006/relationships" xmlns:p="http://schemas.openxmlformats.org/presentationml/2006/main">
-  <p:cSld>
-    <p:spTree>
-      <p:nvGrpSpPr>
-        <p:cNvPr id="1" name="">
-          <a:extLst>
-            <a:ext uri="{FF2B5EF4-FFF2-40B4-BE49-F238E27FC236}">
-              <a16:creationId xmlns:a16="http://schemas.microsoft.com/office/drawing/2014/main" id="{3ACD5F9C-E0A4-8F45-4E7B-59EBEBDD6728}"/>
-            </a:ext>
-          </a:extLst>
-        </p:cNvPr>
-        <p:cNvGrpSpPr/>
-        <p:nvPr/>
-      </p:nvGrpSpPr>
-      <p:grpSpPr>
-        <a:xfrm>
-          <a:off x="0" y="0"/>
-          <a:ext cx="0" cy="0"/>
-          <a:chOff x="0" y="0"/>
-          <a:chExt cx="0" cy="0"/>
-        </a:xfrm>
-      </p:grpSpPr>
-      <p:sp>
-        <p:nvSpPr>
-          <p:cNvPr id="2" name="Title 1">
-            <a:extLst>
-              <a:ext uri="{FF2B5EF4-FFF2-40B4-BE49-F238E27FC236}">
-                <a16:creationId xmlns:a16="http://schemas.microsoft.com/office/drawing/2014/main" id="{D4C5D38F-6CD2-564C-69EC-0A43EC1E8558}"/>
-              </a:ext>
-            </a:extLst>
-          </p:cNvPr>
-          <p:cNvSpPr>
-            <a:spLocks noGrp="1"/>
-          </p:cNvSpPr>
-          <p:nvPr>
-            <p:ph type="title"/>
-          </p:nvPr>
-        </p:nvSpPr>
-        <p:spPr/>
-        <p:txBody>
-          <a:bodyPr/>
-          <a:lstStyle/>
-          <a:p>
-            <a:r>
-              <a:rPr lang="pt-BR" dirty="0"/>
-              <a:t>Persistência de Dados</a:t>
-            </a:r>
-            <a:endParaRPr lang="en-US" dirty="0"/>
-          </a:p>
-        </p:txBody>
-      </p:sp>
-      <p:pic>
-        <p:nvPicPr>
-          <p:cNvPr id="7" name="Imagem 6">
-            <a:extLst>
-              <a:ext uri="{FF2B5EF4-FFF2-40B4-BE49-F238E27FC236}">
-                <a16:creationId xmlns:a16="http://schemas.microsoft.com/office/drawing/2014/main" id="{8D658623-4270-BFEB-FD8F-32FA5D1C5413}"/>
-              </a:ext>
-            </a:extLst>
-          </p:cNvPr>
-          <p:cNvPicPr>
-            <a:picLocks noChangeAspect="1"/>
-          </p:cNvPicPr>
-          <p:nvPr/>
-        </p:nvPicPr>
-        <p:blipFill>
-          <a:blip r:embed="rId2"/>
-          <a:stretch>
-            <a:fillRect/>
-          </a:stretch>
-        </p:blipFill>
-        <p:spPr>
-          <a:xfrm>
-            <a:off x="882595" y="1909917"/>
-            <a:ext cx="7169504" cy="3864083"/>
-          </a:xfrm>
-          <a:prstGeom prst="rect">
-            <a:avLst/>
-          </a:prstGeom>
-        </p:spPr>
-      </p:pic>
-    </p:spTree>
-    <p:extLst>
-      <p:ext uri="{BB962C8B-B14F-4D97-AF65-F5344CB8AC3E}">
-        <p14:creationId xmlns:p14="http://schemas.microsoft.com/office/powerpoint/2010/main" val="3659142428"/>
-      </p:ext>
-    </p:extLst>
-  </p:cSld>
-  <p:clrMapOvr>
-    <a:masterClrMapping/>
-  </p:clrMapOvr>
-</p:sld>
-</file>
-
-<file path=ppt/slides/slide9.xml><?xml version="1.0" encoding="utf-8"?>
-<p:sld xmlns:a="http://schemas.openxmlformats.org/drawingml/2006/main" xmlns:r="http://schemas.openxmlformats.org/officeDocument/2006/relationships" xmlns:p="http://schemas.openxmlformats.org/presentationml/2006/main">
-  <p:cSld>
-    <p:spTree>
-      <p:nvGrpSpPr>
-        <p:cNvPr id="1" name=""/>
-        <p:cNvGrpSpPr/>
-        <p:nvPr/>
-      </p:nvGrpSpPr>
-      <p:grpSpPr>
-        <a:xfrm>
-          <a:off x="0" y="0"/>
-          <a:ext cx="0" cy="0"/>
-          <a:chOff x="0" y="0"/>
-          <a:chExt cx="0" cy="0"/>
-        </a:xfrm>
-      </p:grpSpPr>
-      <p:sp>
-        <p:nvSpPr>
-          <p:cNvPr id="2" name="Title 1">
-            <a:extLst>
-              <a:ext uri="{FF2B5EF4-FFF2-40B4-BE49-F238E27FC236}">
-                <a16:creationId xmlns:a16="http://schemas.microsoft.com/office/drawing/2014/main" id="{D9B1F0FB-5829-4949-9E35-841A9DF31F2D}"/>
-              </a:ext>
-            </a:extLst>
-          </p:cNvPr>
-          <p:cNvSpPr>
-            <a:spLocks noGrp="1"/>
-          </p:cNvSpPr>
-          <p:nvPr>
-            <p:ph type="title"/>
-          </p:nvPr>
-        </p:nvSpPr>
-        <p:spPr/>
-        <p:txBody>
-          <a:bodyPr/>
-          <a:lstStyle/>
-          <a:p>
-            <a:r>
-              <a:rPr lang="pt-BR" dirty="0"/>
-              <a:t>Demonstração </a:t>
-            </a:r>
-            <a:endParaRPr lang="en-GB" dirty="0"/>
-          </a:p>
-        </p:txBody>
-      </p:sp>
-      <p:sp>
-        <p:nvSpPr>
-          <p:cNvPr id="3" name="Text Placeholder 2">
-            <a:extLst>
-              <a:ext uri="{FF2B5EF4-FFF2-40B4-BE49-F238E27FC236}">
-                <a16:creationId xmlns:a16="http://schemas.microsoft.com/office/drawing/2014/main" id="{5ACFCE3B-D4B3-6743-AC05-A671F006A87F}"/>
-              </a:ext>
-            </a:extLst>
-          </p:cNvPr>
-          <p:cNvSpPr>
-            <a:spLocks noGrp="1"/>
-          </p:cNvSpPr>
-          <p:nvPr>
-            <p:ph type="body" idx="1"/>
-          </p:nvPr>
-        </p:nvSpPr>
-        <p:spPr/>
-        <p:txBody>
-          <a:bodyPr/>
-          <a:lstStyle/>
-          <a:p>
-            <a:r>
-              <a:rPr lang="en-GB" dirty="0"/>
-              <a:t>Da </a:t>
-            </a:r>
-            <a:r>
-              <a:rPr lang="en-GB" dirty="0" err="1"/>
-              <a:t>nossa</a:t>
-            </a:r>
-            <a:r>
-              <a:rPr lang="en-GB" dirty="0"/>
-              <a:t> </a:t>
-            </a:r>
-            <a:r>
-              <a:rPr lang="en-GB" dirty="0" err="1"/>
-              <a:t>pokédex</a:t>
-            </a:r>
-            <a:endParaRPr lang="en-GB" dirty="0"/>
-          </a:p>
-        </p:txBody>
-      </p:sp>
-    </p:spTree>
-    <p:extLst>
-      <p:ext uri="{BB962C8B-B14F-4D97-AF65-F5344CB8AC3E}">
-        <p14:creationId xmlns:p14="http://schemas.microsoft.com/office/powerpoint/2010/main" val="3026865914"/>
       </p:ext>
     </p:extLst>
   </p:cSld>

</xml_diff>